<commit_message>
debug energy level and add fig
</commit_message>
<xml_diff>
--- a/fig/report.pptx
+++ b/fig/report.pptx
@@ -17,10 +17,9 @@
     <p:sldId id="264" r:id="rId11"/>
     <p:sldId id="266" r:id="rId12"/>
     <p:sldId id="269" r:id="rId13"/>
-    <p:sldId id="272" r:id="rId14"/>
-    <p:sldId id="270" r:id="rId15"/>
-    <p:sldId id="273" r:id="rId16"/>
-    <p:sldId id="274" r:id="rId17"/>
+    <p:sldId id="270" r:id="rId14"/>
+    <p:sldId id="273" r:id="rId15"/>
+    <p:sldId id="274" r:id="rId16"/>
   </p:sldIdLst>
   <p:sldSz cx="12192000" cy="6858000"/>
   <p:notesSz cx="6858000" cy="9144000"/>
@@ -258,7 +257,7 @@
           <a:p>
             <a:fld id="{926A52A2-628D-41AC-8D8D-9349A46921A5}" type="datetimeFigureOut">
               <a:rPr lang="zh-TW" altLang="en-US" smtClean="0"/>
-              <a:t>2020/5/28</a:t>
+              <a:t>2020/5/30</a:t>
             </a:fld>
             <a:endParaRPr lang="zh-TW" altLang="en-US"/>
           </a:p>
@@ -428,7 +427,7 @@
           <a:p>
             <a:fld id="{926A52A2-628D-41AC-8D8D-9349A46921A5}" type="datetimeFigureOut">
               <a:rPr lang="zh-TW" altLang="en-US" smtClean="0"/>
-              <a:t>2020/5/28</a:t>
+              <a:t>2020/5/30</a:t>
             </a:fld>
             <a:endParaRPr lang="zh-TW" altLang="en-US"/>
           </a:p>
@@ -608,7 +607,7 @@
           <a:p>
             <a:fld id="{926A52A2-628D-41AC-8D8D-9349A46921A5}" type="datetimeFigureOut">
               <a:rPr lang="zh-TW" altLang="en-US" smtClean="0"/>
-              <a:t>2020/5/28</a:t>
+              <a:t>2020/5/30</a:t>
             </a:fld>
             <a:endParaRPr lang="zh-TW" altLang="en-US"/>
           </a:p>
@@ -778,7 +777,7 @@
           <a:p>
             <a:fld id="{926A52A2-628D-41AC-8D8D-9349A46921A5}" type="datetimeFigureOut">
               <a:rPr lang="zh-TW" altLang="en-US" smtClean="0"/>
-              <a:t>2020/5/28</a:t>
+              <a:t>2020/5/30</a:t>
             </a:fld>
             <a:endParaRPr lang="zh-TW" altLang="en-US"/>
           </a:p>
@@ -1024,7 +1023,7 @@
           <a:p>
             <a:fld id="{926A52A2-628D-41AC-8D8D-9349A46921A5}" type="datetimeFigureOut">
               <a:rPr lang="zh-TW" altLang="en-US" smtClean="0"/>
-              <a:t>2020/5/28</a:t>
+              <a:t>2020/5/30</a:t>
             </a:fld>
             <a:endParaRPr lang="zh-TW" altLang="en-US"/>
           </a:p>
@@ -1256,7 +1255,7 @@
           <a:p>
             <a:fld id="{926A52A2-628D-41AC-8D8D-9349A46921A5}" type="datetimeFigureOut">
               <a:rPr lang="zh-TW" altLang="en-US" smtClean="0"/>
-              <a:t>2020/5/28</a:t>
+              <a:t>2020/5/30</a:t>
             </a:fld>
             <a:endParaRPr lang="zh-TW" altLang="en-US"/>
           </a:p>
@@ -1623,7 +1622,7 @@
           <a:p>
             <a:fld id="{926A52A2-628D-41AC-8D8D-9349A46921A5}" type="datetimeFigureOut">
               <a:rPr lang="zh-TW" altLang="en-US" smtClean="0"/>
-              <a:t>2020/5/28</a:t>
+              <a:t>2020/5/30</a:t>
             </a:fld>
             <a:endParaRPr lang="zh-TW" altLang="en-US"/>
           </a:p>
@@ -1741,7 +1740,7 @@
           <a:p>
             <a:fld id="{926A52A2-628D-41AC-8D8D-9349A46921A5}" type="datetimeFigureOut">
               <a:rPr lang="zh-TW" altLang="en-US" smtClean="0"/>
-              <a:t>2020/5/28</a:t>
+              <a:t>2020/5/30</a:t>
             </a:fld>
             <a:endParaRPr lang="zh-TW" altLang="en-US"/>
           </a:p>
@@ -1836,7 +1835,7 @@
           <a:p>
             <a:fld id="{926A52A2-628D-41AC-8D8D-9349A46921A5}" type="datetimeFigureOut">
               <a:rPr lang="zh-TW" altLang="en-US" smtClean="0"/>
-              <a:t>2020/5/28</a:t>
+              <a:t>2020/5/30</a:t>
             </a:fld>
             <a:endParaRPr lang="zh-TW" altLang="en-US"/>
           </a:p>
@@ -2113,7 +2112,7 @@
           <a:p>
             <a:fld id="{926A52A2-628D-41AC-8D8D-9349A46921A5}" type="datetimeFigureOut">
               <a:rPr lang="zh-TW" altLang="en-US" smtClean="0"/>
-              <a:t>2020/5/28</a:t>
+              <a:t>2020/5/30</a:t>
             </a:fld>
             <a:endParaRPr lang="zh-TW" altLang="en-US"/>
           </a:p>
@@ -2366,7 +2365,7 @@
           <a:p>
             <a:fld id="{926A52A2-628D-41AC-8D8D-9349A46921A5}" type="datetimeFigureOut">
               <a:rPr lang="zh-TW" altLang="en-US" smtClean="0"/>
-              <a:t>2020/5/28</a:t>
+              <a:t>2020/5/30</a:t>
             </a:fld>
             <a:endParaRPr lang="zh-TW" altLang="en-US"/>
           </a:p>
@@ -2597,7 +2596,7 @@
           <a:p>
             <a:fld id="{926A52A2-628D-41AC-8D8D-9349A46921A5}" type="datetimeFigureOut">
               <a:rPr lang="zh-TW" altLang="en-US" smtClean="0"/>
-              <a:t>2020/5/28</a:t>
+              <a:t>2020/5/30</a:t>
             </a:fld>
             <a:endParaRPr lang="zh-TW" altLang="en-US"/>
           </a:p>
@@ -3331,8 +3330,38 @@
         </p:blipFill>
         <p:spPr>
           <a:xfrm>
-            <a:off x="746630" y="0"/>
-            <a:ext cx="10287000" cy="6858000"/>
+            <a:off x="3636338" y="288453"/>
+            <a:ext cx="4800600" cy="3200400"/>
+          </a:xfrm>
+          <a:prstGeom prst="rect">
+            <a:avLst/>
+          </a:prstGeom>
+        </p:spPr>
+      </p:pic>
+      <p:pic>
+        <p:nvPicPr>
+          <p:cNvPr id="4" name="圖片 3"/>
+          <p:cNvPicPr>
+            <a:picLocks noChangeAspect="1"/>
+          </p:cNvPicPr>
+          <p:nvPr/>
+        </p:nvPicPr>
+        <p:blipFill>
+          <a:blip r:embed="rId3" cstate="print">
+            <a:extLst>
+              <a:ext uri="{28A0092B-C50C-407E-A947-70E740481C1C}">
+                <a14:useLocalDpi xmlns:a14="http://schemas.microsoft.com/office/drawing/2010/main" val="0"/>
+              </a:ext>
+            </a:extLst>
+          </a:blip>
+          <a:stretch>
+            <a:fillRect/>
+          </a:stretch>
+        </p:blipFill>
+        <p:spPr>
+          <a:xfrm>
+            <a:off x="3636338" y="3488853"/>
+            <a:ext cx="4800600" cy="3200400"/>
           </a:xfrm>
           <a:prstGeom prst="rect">
             <a:avLst/>
@@ -3353,66 +3382,6 @@
 </file>
 
 <file path=ppt/slides/slide13.xml><?xml version="1.0" encoding="utf-8"?>
-<p:sld xmlns:a="http://schemas.openxmlformats.org/drawingml/2006/main" xmlns:r="http://schemas.openxmlformats.org/officeDocument/2006/relationships" xmlns:p="http://schemas.openxmlformats.org/presentationml/2006/main">
-  <p:cSld>
-    <p:spTree>
-      <p:nvGrpSpPr>
-        <p:cNvPr id="1" name=""/>
-        <p:cNvGrpSpPr/>
-        <p:nvPr/>
-      </p:nvGrpSpPr>
-      <p:grpSpPr>
-        <a:xfrm>
-          <a:off x="0" y="0"/>
-          <a:ext cx="0" cy="0"/>
-          <a:chOff x="0" y="0"/>
-          <a:chExt cx="0" cy="0"/>
-        </a:xfrm>
-      </p:grpSpPr>
-      <p:pic>
-        <p:nvPicPr>
-          <p:cNvPr id="2" name="圖片 1"/>
-          <p:cNvPicPr>
-            <a:picLocks noChangeAspect="1"/>
-          </p:cNvPicPr>
-          <p:nvPr/>
-        </p:nvPicPr>
-        <p:blipFill>
-          <a:blip r:embed="rId2" cstate="print">
-            <a:extLst>
-              <a:ext uri="{28A0092B-C50C-407E-A947-70E740481C1C}">
-                <a14:useLocalDpi xmlns:a14="http://schemas.microsoft.com/office/drawing/2010/main" val="0"/>
-              </a:ext>
-            </a:extLst>
-          </a:blip>
-          <a:stretch>
-            <a:fillRect/>
-          </a:stretch>
-        </p:blipFill>
-        <p:spPr>
-          <a:xfrm>
-            <a:off x="2189884" y="911907"/>
-            <a:ext cx="6912864" cy="4608576"/>
-          </a:xfrm>
-          <a:prstGeom prst="rect">
-            <a:avLst/>
-          </a:prstGeom>
-        </p:spPr>
-      </p:pic>
-    </p:spTree>
-    <p:extLst>
-      <p:ext uri="{BB962C8B-B14F-4D97-AF65-F5344CB8AC3E}">
-        <p14:creationId xmlns:p14="http://schemas.microsoft.com/office/powerpoint/2010/main" val="2199739331"/>
-      </p:ext>
-    </p:extLst>
-  </p:cSld>
-  <p:clrMapOvr>
-    <a:masterClrMapping/>
-  </p:clrMapOvr>
-</p:sld>
-</file>
-
-<file path=ppt/slides/slide14.xml><?xml version="1.0" encoding="utf-8"?>
 <p:sld xmlns:a="http://schemas.openxmlformats.org/drawingml/2006/main" xmlns:r="http://schemas.openxmlformats.org/officeDocument/2006/relationships" xmlns:p="http://schemas.openxmlformats.org/presentationml/2006/main">
   <p:cSld>
     <p:spTree>
@@ -3633,7 +3602,7 @@
 </p:sld>
 </file>
 
-<file path=ppt/slides/slide15.xml><?xml version="1.0" encoding="utf-8"?>
+<file path=ppt/slides/slide14.xml><?xml version="1.0" encoding="utf-8"?>
 <p:sld xmlns:a="http://schemas.openxmlformats.org/drawingml/2006/main" xmlns:r="http://schemas.openxmlformats.org/officeDocument/2006/relationships" xmlns:p="http://schemas.openxmlformats.org/presentationml/2006/main">
   <p:cSld>
     <p:spTree>
@@ -3723,7 +3692,7 @@
 </p:sld>
 </file>
 
-<file path=ppt/slides/slide16.xml><?xml version="1.0" encoding="utf-8"?>
+<file path=ppt/slides/slide15.xml><?xml version="1.0" encoding="utf-8"?>
 <p:sld xmlns:a="http://schemas.openxmlformats.org/drawingml/2006/main" xmlns:r="http://schemas.openxmlformats.org/officeDocument/2006/relationships" xmlns:p="http://schemas.openxmlformats.org/presentationml/2006/main">
   <p:cSld>
     <p:spTree>
@@ -4008,6 +3977,13 @@
   <p:clrMapOvr>
     <a:masterClrMapping/>
   </p:clrMapOvr>
+  <p:timing>
+    <p:tnLst>
+      <p:par>
+        <p:cTn id="1" dur="indefinite" restart="never" nodeType="tmRoot"/>
+      </p:par>
+    </p:tnLst>
+  </p:timing>
 </p:sld>
 </file>
 
@@ -4030,23 +4006,23 @@
       </p:grpSpPr>
       <p:grpSp>
         <p:nvGrpSpPr>
-          <p:cNvPr id="7" name="群組 6"/>
+          <p:cNvPr id="15" name="群組 14"/>
           <p:cNvGrpSpPr/>
           <p:nvPr/>
         </p:nvGrpSpPr>
         <p:grpSpPr>
           <a:xfrm>
-            <a:off x="2759400" y="326258"/>
-            <a:ext cx="7343576" cy="5689600"/>
-            <a:chOff x="2634709" y="326257"/>
-            <a:chExt cx="7343576" cy="5689600"/>
+            <a:off x="3177740" y="87868"/>
+            <a:ext cx="6400800" cy="6400800"/>
+            <a:chOff x="3614112" y="87868"/>
+            <a:chExt cx="6400800" cy="6400800"/>
           </a:xfrm>
         </p:grpSpPr>
         <p:pic>
           <p:nvPicPr>
-            <p:cNvPr id="2" name="圖片 1"/>
+            <p:cNvPr id="9" name="圖片 8"/>
             <p:cNvPicPr>
-              <a:picLocks noChangeAspect="1"/>
+              <a:picLocks/>
             </p:cNvPicPr>
             <p:nvPr/>
           </p:nvPicPr>
@@ -4064,8 +4040,8 @@
           </p:blipFill>
           <p:spPr>
             <a:xfrm>
-              <a:off x="2634709" y="326257"/>
-              <a:ext cx="3756315" cy="5689600"/>
+              <a:off x="3614112" y="87868"/>
+              <a:ext cx="3200400" cy="6400800"/>
             </a:xfrm>
             <a:prstGeom prst="rect">
               <a:avLst/>
@@ -4074,27 +4050,58 @@
         </p:pic>
         <p:pic>
           <p:nvPicPr>
-            <p:cNvPr id="3" name="圖片 2"/>
+            <p:cNvPr id="11" name="圖片 10"/>
             <p:cNvPicPr>
               <a:picLocks noChangeAspect="1"/>
             </p:cNvPicPr>
             <p:nvPr/>
           </p:nvPicPr>
-          <p:blipFill rotWithShape="1">
-            <a:blip r:embed="rId3" cstate="print">
+          <p:blipFill>
+            <a:blip r:embed="rId3">
               <a:extLst>
                 <a:ext uri="{28A0092B-C50C-407E-A947-70E740481C1C}">
                   <a14:useLocalDpi xmlns:a14="http://schemas.microsoft.com/office/drawing/2010/main" val="0"/>
                 </a:ext>
               </a:extLst>
             </a:blip>
-            <a:srcRect l="2778" t="9470" r="5147"/>
-            <a:stretch/>
+            <a:stretch>
+              <a:fillRect/>
+            </a:stretch>
           </p:blipFill>
           <p:spPr>
             <a:xfrm>
-              <a:off x="6391024" y="326257"/>
-              <a:ext cx="3587261" cy="2671170"/>
+              <a:off x="6814512" y="3288268"/>
+              <a:ext cx="3200400" cy="3200400"/>
+            </a:xfrm>
+            <a:prstGeom prst="rect">
+              <a:avLst/>
+            </a:prstGeom>
+          </p:spPr>
+        </p:pic>
+        <p:pic>
+          <p:nvPicPr>
+            <p:cNvPr id="14" name="圖片 13"/>
+            <p:cNvPicPr>
+              <a:picLocks noChangeAspect="1"/>
+            </p:cNvPicPr>
+            <p:nvPr/>
+          </p:nvPicPr>
+          <p:blipFill>
+            <a:blip r:embed="rId4" cstate="print">
+              <a:extLst>
+                <a:ext uri="{28A0092B-C50C-407E-A947-70E740481C1C}">
+                  <a14:useLocalDpi xmlns:a14="http://schemas.microsoft.com/office/drawing/2010/main" val="0"/>
+                </a:ext>
+              </a:extLst>
+            </a:blip>
+            <a:stretch>
+              <a:fillRect/>
+            </a:stretch>
+          </p:blipFill>
+          <p:spPr>
+            <a:xfrm>
+              <a:off x="6814512" y="87868"/>
+              <a:ext cx="3200400" cy="3200400"/>
             </a:xfrm>
             <a:prstGeom prst="rect">
               <a:avLst/>
@@ -4104,14 +4111,14 @@
       </p:grpSp>
       <p:sp>
         <p:nvSpPr>
-          <p:cNvPr id="6" name="矩形 5"/>
+          <p:cNvPr id="16" name="矩形 15"/>
           <p:cNvSpPr/>
           <p:nvPr/>
         </p:nvSpPr>
         <p:spPr>
           <a:xfrm>
-            <a:off x="5299569" y="6488668"/>
-            <a:ext cx="2664127" cy="369332"/>
+            <a:off x="5107631" y="6488668"/>
+            <a:ext cx="2541017" cy="369332"/>
           </a:xfrm>
           <a:prstGeom prst="rect">
             <a:avLst/>
@@ -4124,8 +4131,12 @@
           <a:lstStyle/>
           <a:p>
             <a:r>
+              <a:rPr lang="zh-TW" altLang="en-US" dirty="0"/>
+              <a:t>PhysRevLett.114.</a:t>
+            </a:r>
+            <a:r>
               <a:rPr lang="zh-TW" altLang="en-US" dirty="0" smtClean="0"/>
-              <a:t>PhysRevApplied.7.044002</a:t>
+              <a:t>233601</a:t>
             </a:r>
             <a:endParaRPr lang="zh-TW" altLang="en-US" dirty="0"/>
           </a:p>
@@ -4141,6 +4152,13 @@
   <p:clrMapOvr>
     <a:masterClrMapping/>
   </p:clrMapOvr>
+  <p:timing>
+    <p:tnLst>
+      <p:par>
+        <p:cTn id="1" dur="indefinite" restart="never" nodeType="tmRoot"/>
+      </p:par>
+    </p:tnLst>
+  </p:timing>
 </p:sld>
 </file>
 
@@ -4192,7 +4210,7 @@
       </p:sp>
       <p:pic>
         <p:nvPicPr>
-          <p:cNvPr id="4" name="圖片 3"/>
+          <p:cNvPr id="2" name="圖片 1"/>
           <p:cNvPicPr>
             <a:picLocks noChangeAspect="1"/>
           </p:cNvPicPr>
@@ -4212,8 +4230,8 @@
         </p:blipFill>
         <p:spPr>
           <a:xfrm>
-            <a:off x="1008088" y="387927"/>
-            <a:ext cx="10147685" cy="5708073"/>
+            <a:off x="997313" y="360217"/>
+            <a:ext cx="10169236" cy="5720195"/>
           </a:xfrm>
           <a:prstGeom prst="rect">
             <a:avLst/>
@@ -4230,6 +4248,13 @@
   <p:clrMapOvr>
     <a:masterClrMapping/>
   </p:clrMapOvr>
+  <p:timing>
+    <p:tnLst>
+      <p:par>
+        <p:cTn id="1" dur="indefinite" restart="never" nodeType="tmRoot"/>
+      </p:par>
+    </p:tnLst>
+  </p:timing>
 </p:sld>
 </file>
 
@@ -4319,6 +4344,13 @@
   <p:clrMapOvr>
     <a:masterClrMapping/>
   </p:clrMapOvr>
+  <p:timing>
+    <p:tnLst>
+      <p:par>
+        <p:cTn id="1" dur="indefinite" restart="never" nodeType="tmRoot"/>
+      </p:par>
+    </p:tnLst>
+  </p:timing>
 </p:sld>
 </file>
 

</xml_diff>

<commit_message>
add operator and state py
</commit_message>
<xml_diff>
--- a/fig/report.pptx
+++ b/fig/report.pptx
@@ -6,20 +6,18 @@
   </p:sldMasterIdLst>
   <p:sldIdLst>
     <p:sldId id="256" r:id="rId2"/>
-    <p:sldId id="260" r:id="rId3"/>
-    <p:sldId id="262" r:id="rId4"/>
-    <p:sldId id="261" r:id="rId5"/>
-    <p:sldId id="259" r:id="rId6"/>
-    <p:sldId id="265" r:id="rId7"/>
-    <p:sldId id="268" r:id="rId8"/>
-    <p:sldId id="267" r:id="rId9"/>
-    <p:sldId id="263" r:id="rId10"/>
-    <p:sldId id="264" r:id="rId11"/>
-    <p:sldId id="266" r:id="rId12"/>
-    <p:sldId id="269" r:id="rId13"/>
-    <p:sldId id="270" r:id="rId14"/>
-    <p:sldId id="273" r:id="rId15"/>
-    <p:sldId id="274" r:id="rId16"/>
+    <p:sldId id="262" r:id="rId3"/>
+    <p:sldId id="261" r:id="rId4"/>
+    <p:sldId id="259" r:id="rId5"/>
+    <p:sldId id="265" r:id="rId6"/>
+    <p:sldId id="268" r:id="rId7"/>
+    <p:sldId id="267" r:id="rId8"/>
+    <p:sldId id="263" r:id="rId9"/>
+    <p:sldId id="264" r:id="rId10"/>
+    <p:sldId id="266" r:id="rId11"/>
+    <p:sldId id="269" r:id="rId12"/>
+    <p:sldId id="270" r:id="rId13"/>
+    <p:sldId id="274" r:id="rId14"/>
   </p:sldIdLst>
   <p:sldSz cx="12192000" cy="6858000"/>
   <p:notesSz cx="6858000" cy="9144000"/>
@@ -257,7 +255,7 @@
           <a:p>
             <a:fld id="{926A52A2-628D-41AC-8D8D-9349A46921A5}" type="datetimeFigureOut">
               <a:rPr lang="zh-TW" altLang="en-US" smtClean="0"/>
-              <a:t>2020/5/30</a:t>
+              <a:t>2020/6/1</a:t>
             </a:fld>
             <a:endParaRPr lang="zh-TW" altLang="en-US"/>
           </a:p>
@@ -427,7 +425,7 @@
           <a:p>
             <a:fld id="{926A52A2-628D-41AC-8D8D-9349A46921A5}" type="datetimeFigureOut">
               <a:rPr lang="zh-TW" altLang="en-US" smtClean="0"/>
-              <a:t>2020/5/30</a:t>
+              <a:t>2020/6/1</a:t>
             </a:fld>
             <a:endParaRPr lang="zh-TW" altLang="en-US"/>
           </a:p>
@@ -607,7 +605,7 @@
           <a:p>
             <a:fld id="{926A52A2-628D-41AC-8D8D-9349A46921A5}" type="datetimeFigureOut">
               <a:rPr lang="zh-TW" altLang="en-US" smtClean="0"/>
-              <a:t>2020/5/30</a:t>
+              <a:t>2020/6/1</a:t>
             </a:fld>
             <a:endParaRPr lang="zh-TW" altLang="en-US"/>
           </a:p>
@@ -777,7 +775,7 @@
           <a:p>
             <a:fld id="{926A52A2-628D-41AC-8D8D-9349A46921A5}" type="datetimeFigureOut">
               <a:rPr lang="zh-TW" altLang="en-US" smtClean="0"/>
-              <a:t>2020/5/30</a:t>
+              <a:t>2020/6/1</a:t>
             </a:fld>
             <a:endParaRPr lang="zh-TW" altLang="en-US"/>
           </a:p>
@@ -1023,7 +1021,7 @@
           <a:p>
             <a:fld id="{926A52A2-628D-41AC-8D8D-9349A46921A5}" type="datetimeFigureOut">
               <a:rPr lang="zh-TW" altLang="en-US" smtClean="0"/>
-              <a:t>2020/5/30</a:t>
+              <a:t>2020/6/1</a:t>
             </a:fld>
             <a:endParaRPr lang="zh-TW" altLang="en-US"/>
           </a:p>
@@ -1255,7 +1253,7 @@
           <a:p>
             <a:fld id="{926A52A2-628D-41AC-8D8D-9349A46921A5}" type="datetimeFigureOut">
               <a:rPr lang="zh-TW" altLang="en-US" smtClean="0"/>
-              <a:t>2020/5/30</a:t>
+              <a:t>2020/6/1</a:t>
             </a:fld>
             <a:endParaRPr lang="zh-TW" altLang="en-US"/>
           </a:p>
@@ -1622,7 +1620,7 @@
           <a:p>
             <a:fld id="{926A52A2-628D-41AC-8D8D-9349A46921A5}" type="datetimeFigureOut">
               <a:rPr lang="zh-TW" altLang="en-US" smtClean="0"/>
-              <a:t>2020/5/30</a:t>
+              <a:t>2020/6/1</a:t>
             </a:fld>
             <a:endParaRPr lang="zh-TW" altLang="en-US"/>
           </a:p>
@@ -1740,7 +1738,7 @@
           <a:p>
             <a:fld id="{926A52A2-628D-41AC-8D8D-9349A46921A5}" type="datetimeFigureOut">
               <a:rPr lang="zh-TW" altLang="en-US" smtClean="0"/>
-              <a:t>2020/5/30</a:t>
+              <a:t>2020/6/1</a:t>
             </a:fld>
             <a:endParaRPr lang="zh-TW" altLang="en-US"/>
           </a:p>
@@ -1835,7 +1833,7 @@
           <a:p>
             <a:fld id="{926A52A2-628D-41AC-8D8D-9349A46921A5}" type="datetimeFigureOut">
               <a:rPr lang="zh-TW" altLang="en-US" smtClean="0"/>
-              <a:t>2020/5/30</a:t>
+              <a:t>2020/6/1</a:t>
             </a:fld>
             <a:endParaRPr lang="zh-TW" altLang="en-US"/>
           </a:p>
@@ -2112,7 +2110,7 @@
           <a:p>
             <a:fld id="{926A52A2-628D-41AC-8D8D-9349A46921A5}" type="datetimeFigureOut">
               <a:rPr lang="zh-TW" altLang="en-US" smtClean="0"/>
-              <a:t>2020/5/30</a:t>
+              <a:t>2020/6/1</a:t>
             </a:fld>
             <a:endParaRPr lang="zh-TW" altLang="en-US"/>
           </a:p>
@@ -2365,7 +2363,7 @@
           <a:p>
             <a:fld id="{926A52A2-628D-41AC-8D8D-9349A46921A5}" type="datetimeFigureOut">
               <a:rPr lang="zh-TW" altLang="en-US" smtClean="0"/>
-              <a:t>2020/5/30</a:t>
+              <a:t>2020/6/1</a:t>
             </a:fld>
             <a:endParaRPr lang="zh-TW" altLang="en-US"/>
           </a:p>
@@ -2596,7 +2594,7 @@
           <a:p>
             <a:fld id="{926A52A2-628D-41AC-8D8D-9349A46921A5}" type="datetimeFigureOut">
               <a:rPr lang="zh-TW" altLang="en-US" smtClean="0"/>
-              <a:t>2020/5/30</a:t>
+              <a:t>2020/6/1</a:t>
             </a:fld>
             <a:endParaRPr lang="zh-TW" altLang="en-US"/>
           </a:p>
@@ -3069,66 +3067,6 @@
           <a:chExt cx="0" cy="0"/>
         </a:xfrm>
       </p:grpSpPr>
-      <p:pic>
-        <p:nvPicPr>
-          <p:cNvPr id="2" name="圖片 1"/>
-          <p:cNvPicPr>
-            <a:picLocks noChangeAspect="1"/>
-          </p:cNvPicPr>
-          <p:nvPr/>
-        </p:nvPicPr>
-        <p:blipFill>
-          <a:blip r:embed="rId2" cstate="print">
-            <a:extLst>
-              <a:ext uri="{28A0092B-C50C-407E-A947-70E740481C1C}">
-                <a14:useLocalDpi xmlns:a14="http://schemas.microsoft.com/office/drawing/2010/main" val="0"/>
-              </a:ext>
-            </a:extLst>
-          </a:blip>
-          <a:stretch>
-            <a:fillRect/>
-          </a:stretch>
-        </p:blipFill>
-        <p:spPr>
-          <a:xfrm>
-            <a:off x="1800225" y="233507"/>
-            <a:ext cx="8479412" cy="5652941"/>
-          </a:xfrm>
-          <a:prstGeom prst="rect">
-            <a:avLst/>
-          </a:prstGeom>
-        </p:spPr>
-      </p:pic>
-    </p:spTree>
-    <p:extLst>
-      <p:ext uri="{BB962C8B-B14F-4D97-AF65-F5344CB8AC3E}">
-        <p14:creationId xmlns:p14="http://schemas.microsoft.com/office/powerpoint/2010/main" val="1640291520"/>
-      </p:ext>
-    </p:extLst>
-  </p:cSld>
-  <p:clrMapOvr>
-    <a:masterClrMapping/>
-  </p:clrMapOvr>
-</p:sld>
-</file>
-
-<file path=ppt/slides/slide11.xml><?xml version="1.0" encoding="utf-8"?>
-<p:sld xmlns:a="http://schemas.openxmlformats.org/drawingml/2006/main" xmlns:r="http://schemas.openxmlformats.org/officeDocument/2006/relationships" xmlns:p="http://schemas.openxmlformats.org/presentationml/2006/main">
-  <p:cSld>
-    <p:spTree>
-      <p:nvGrpSpPr>
-        <p:cNvPr id="1" name=""/>
-        <p:cNvGrpSpPr/>
-        <p:nvPr/>
-      </p:nvGrpSpPr>
-      <p:grpSpPr>
-        <a:xfrm>
-          <a:off x="0" y="0"/>
-          <a:ext cx="0" cy="0"/>
-          <a:chOff x="0" y="0"/>
-          <a:chExt cx="0" cy="0"/>
-        </a:xfrm>
-      </p:grpSpPr>
       <p:sp>
         <p:nvSpPr>
           <p:cNvPr id="7" name="矩形 6"/>
@@ -3288,100 +3226,17 @@
   <p:clrMapOvr>
     <a:masterClrMapping/>
   </p:clrMapOvr>
+  <p:timing>
+    <p:tnLst>
+      <p:par>
+        <p:cTn id="1" dur="indefinite" restart="never" nodeType="tmRoot"/>
+      </p:par>
+    </p:tnLst>
+  </p:timing>
 </p:sld>
 </file>
 
-<file path=ppt/slides/slide12.xml><?xml version="1.0" encoding="utf-8"?>
-<p:sld xmlns:a="http://schemas.openxmlformats.org/drawingml/2006/main" xmlns:r="http://schemas.openxmlformats.org/officeDocument/2006/relationships" xmlns:p="http://schemas.openxmlformats.org/presentationml/2006/main">
-  <p:cSld>
-    <p:spTree>
-      <p:nvGrpSpPr>
-        <p:cNvPr id="1" name=""/>
-        <p:cNvGrpSpPr/>
-        <p:nvPr/>
-      </p:nvGrpSpPr>
-      <p:grpSpPr>
-        <a:xfrm>
-          <a:off x="0" y="0"/>
-          <a:ext cx="0" cy="0"/>
-          <a:chOff x="0" y="0"/>
-          <a:chExt cx="0" cy="0"/>
-        </a:xfrm>
-      </p:grpSpPr>
-      <p:pic>
-        <p:nvPicPr>
-          <p:cNvPr id="3" name="圖片 2"/>
-          <p:cNvPicPr>
-            <a:picLocks noChangeAspect="1"/>
-          </p:cNvPicPr>
-          <p:nvPr/>
-        </p:nvPicPr>
-        <p:blipFill>
-          <a:blip r:embed="rId2" cstate="print">
-            <a:extLst>
-              <a:ext uri="{28A0092B-C50C-407E-A947-70E740481C1C}">
-                <a14:useLocalDpi xmlns:a14="http://schemas.microsoft.com/office/drawing/2010/main" val="0"/>
-              </a:ext>
-            </a:extLst>
-          </a:blip>
-          <a:stretch>
-            <a:fillRect/>
-          </a:stretch>
-        </p:blipFill>
-        <p:spPr>
-          <a:xfrm>
-            <a:off x="3636338" y="288453"/>
-            <a:ext cx="4800600" cy="3200400"/>
-          </a:xfrm>
-          <a:prstGeom prst="rect">
-            <a:avLst/>
-          </a:prstGeom>
-        </p:spPr>
-      </p:pic>
-      <p:pic>
-        <p:nvPicPr>
-          <p:cNvPr id="4" name="圖片 3"/>
-          <p:cNvPicPr>
-            <a:picLocks noChangeAspect="1"/>
-          </p:cNvPicPr>
-          <p:nvPr/>
-        </p:nvPicPr>
-        <p:blipFill>
-          <a:blip r:embed="rId3" cstate="print">
-            <a:extLst>
-              <a:ext uri="{28A0092B-C50C-407E-A947-70E740481C1C}">
-                <a14:useLocalDpi xmlns:a14="http://schemas.microsoft.com/office/drawing/2010/main" val="0"/>
-              </a:ext>
-            </a:extLst>
-          </a:blip>
-          <a:stretch>
-            <a:fillRect/>
-          </a:stretch>
-        </p:blipFill>
-        <p:spPr>
-          <a:xfrm>
-            <a:off x="3636338" y="3488853"/>
-            <a:ext cx="4800600" cy="3200400"/>
-          </a:xfrm>
-          <a:prstGeom prst="rect">
-            <a:avLst/>
-          </a:prstGeom>
-        </p:spPr>
-      </p:pic>
-    </p:spTree>
-    <p:extLst>
-      <p:ext uri="{BB962C8B-B14F-4D97-AF65-F5344CB8AC3E}">
-        <p14:creationId xmlns:p14="http://schemas.microsoft.com/office/powerpoint/2010/main" val="1426821204"/>
-      </p:ext>
-    </p:extLst>
-  </p:cSld>
-  <p:clrMapOvr>
-    <a:masterClrMapping/>
-  </p:clrMapOvr>
-</p:sld>
-</file>
-
-<file path=ppt/slides/slide13.xml><?xml version="1.0" encoding="utf-8"?>
+<file path=ppt/slides/slide11.xml><?xml version="1.0" encoding="utf-8"?>
 <p:sld xmlns:a="http://schemas.openxmlformats.org/drawingml/2006/main" xmlns:r="http://schemas.openxmlformats.org/officeDocument/2006/relationships" xmlns:p="http://schemas.openxmlformats.org/presentationml/2006/main">
   <p:cSld>
     <p:spTree>
@@ -3400,21 +3255,21 @@
       </p:grpSpPr>
       <p:grpSp>
         <p:nvGrpSpPr>
-          <p:cNvPr id="14" name="群組 13"/>
+          <p:cNvPr id="13" name="群組 12"/>
           <p:cNvGrpSpPr/>
           <p:nvPr/>
         </p:nvGrpSpPr>
         <p:grpSpPr>
           <a:xfrm>
-            <a:off x="2344349" y="457200"/>
+            <a:off x="2099365" y="3581347"/>
             <a:ext cx="8001000" cy="3200400"/>
-            <a:chOff x="368183" y="1641719"/>
+            <a:chOff x="2099365" y="3581347"/>
             <a:chExt cx="8001000" cy="3200400"/>
           </a:xfrm>
         </p:grpSpPr>
         <p:pic>
           <p:nvPicPr>
-            <p:cNvPr id="9" name="圖片 8"/>
+            <p:cNvPr id="6" name="圖片 5"/>
             <p:cNvPicPr>
               <a:picLocks noChangeAspect="1"/>
             </p:cNvPicPr>
@@ -3434,8 +3289,8 @@
           </p:blipFill>
           <p:spPr>
             <a:xfrm>
-              <a:off x="368183" y="1641719"/>
-              <a:ext cx="4800600" cy="3200400"/>
+              <a:off x="6899965" y="3581347"/>
+              <a:ext cx="3200400" cy="3200400"/>
             </a:xfrm>
             <a:prstGeom prst="rect">
               <a:avLst/>
@@ -3464,8 +3319,8 @@
           </p:blipFill>
           <p:spPr>
             <a:xfrm>
-              <a:off x="5168783" y="1641719"/>
-              <a:ext cx="3200400" cy="3200400"/>
+              <a:off x="2099365" y="3581347"/>
+              <a:ext cx="4800600" cy="3200400"/>
             </a:xfrm>
             <a:prstGeom prst="rect">
               <a:avLst/>
@@ -3475,21 +3330,21 @@
       </p:grpSp>
       <p:grpSp>
         <p:nvGrpSpPr>
-          <p:cNvPr id="15" name="群組 14"/>
+          <p:cNvPr id="14" name="群組 13"/>
           <p:cNvGrpSpPr/>
           <p:nvPr/>
         </p:nvGrpSpPr>
         <p:grpSpPr>
           <a:xfrm>
-            <a:off x="2344349" y="3657600"/>
+            <a:off x="2099365" y="380947"/>
             <a:ext cx="8001000" cy="3200400"/>
-            <a:chOff x="1878250" y="1486486"/>
+            <a:chOff x="1980451" y="62345"/>
             <a:chExt cx="8001000" cy="3200400"/>
           </a:xfrm>
         </p:grpSpPr>
         <p:pic>
           <p:nvPicPr>
-            <p:cNvPr id="16" name="圖片 15"/>
+            <p:cNvPr id="5" name="圖片 4"/>
             <p:cNvPicPr>
               <a:picLocks noChangeAspect="1"/>
             </p:cNvPicPr>
@@ -3509,8 +3364,8 @@
           </p:blipFill>
           <p:spPr>
             <a:xfrm>
-              <a:off x="1878250" y="1486486"/>
-              <a:ext cx="4800600" cy="3200400"/>
+              <a:off x="6781051" y="62345"/>
+              <a:ext cx="3200400" cy="3200400"/>
             </a:xfrm>
             <a:prstGeom prst="rect">
               <a:avLst/>
@@ -3519,7 +3374,7 @@
         </p:pic>
         <p:pic>
           <p:nvPicPr>
-            <p:cNvPr id="17" name="圖片 16"/>
+            <p:cNvPr id="12" name="圖片 11"/>
             <p:cNvPicPr>
               <a:picLocks noChangeAspect="1"/>
             </p:cNvPicPr>
@@ -3539,14 +3394,216 @@
           </p:blipFill>
           <p:spPr>
             <a:xfrm>
-              <a:off x="6678850" y="1486486"/>
-              <a:ext cx="3200400" cy="3200400"/>
+              <a:off x="1980451" y="62345"/>
+              <a:ext cx="4800600" cy="3200400"/>
             </a:xfrm>
             <a:prstGeom prst="rect">
               <a:avLst/>
             </a:prstGeom>
           </p:spPr>
         </p:pic>
+      </p:grpSp>
+    </p:spTree>
+    <p:extLst>
+      <p:ext uri="{BB962C8B-B14F-4D97-AF65-F5344CB8AC3E}">
+        <p14:creationId xmlns:p14="http://schemas.microsoft.com/office/powerpoint/2010/main" val="1426821204"/>
+      </p:ext>
+    </p:extLst>
+  </p:cSld>
+  <p:clrMapOvr>
+    <a:masterClrMapping/>
+  </p:clrMapOvr>
+  <p:timing>
+    <p:tnLst>
+      <p:par>
+        <p:cTn id="1" dur="indefinite" restart="never" nodeType="tmRoot"/>
+      </p:par>
+    </p:tnLst>
+  </p:timing>
+</p:sld>
+</file>
+
+<file path=ppt/slides/slide12.xml><?xml version="1.0" encoding="utf-8"?>
+<p:sld xmlns:a="http://schemas.openxmlformats.org/drawingml/2006/main" xmlns:r="http://schemas.openxmlformats.org/officeDocument/2006/relationships" xmlns:p="http://schemas.openxmlformats.org/presentationml/2006/main">
+  <p:cSld>
+    <p:spTree>
+      <p:nvGrpSpPr>
+        <p:cNvPr id="1" name=""/>
+        <p:cNvGrpSpPr/>
+        <p:nvPr/>
+      </p:nvGrpSpPr>
+      <p:grpSpPr>
+        <a:xfrm>
+          <a:off x="0" y="0"/>
+          <a:ext cx="0" cy="0"/>
+          <a:chOff x="0" y="0"/>
+          <a:chExt cx="0" cy="0"/>
+        </a:xfrm>
+      </p:grpSpPr>
+      <p:grpSp>
+        <p:nvGrpSpPr>
+          <p:cNvPr id="9" name="群組 8"/>
+          <p:cNvGrpSpPr/>
+          <p:nvPr/>
+        </p:nvGrpSpPr>
+        <p:grpSpPr>
+          <a:xfrm>
+            <a:off x="2197946" y="580413"/>
+            <a:ext cx="8001000" cy="6400800"/>
+            <a:chOff x="2419619" y="710384"/>
+            <a:chExt cx="8001000" cy="6400800"/>
+          </a:xfrm>
+        </p:grpSpPr>
+        <p:grpSp>
+          <p:nvGrpSpPr>
+            <p:cNvPr id="7" name="群組 6"/>
+            <p:cNvGrpSpPr/>
+            <p:nvPr/>
+          </p:nvGrpSpPr>
+          <p:grpSpPr>
+            <a:xfrm>
+              <a:off x="2419619" y="710384"/>
+              <a:ext cx="8001000" cy="3200400"/>
+              <a:chOff x="1892277" y="977655"/>
+              <a:chExt cx="8001000" cy="3200400"/>
+            </a:xfrm>
+          </p:grpSpPr>
+          <p:pic>
+            <p:nvPicPr>
+              <p:cNvPr id="5" name="圖片 4"/>
+              <p:cNvPicPr>
+                <a:picLocks noChangeAspect="1"/>
+              </p:cNvPicPr>
+              <p:nvPr/>
+            </p:nvPicPr>
+            <p:blipFill>
+              <a:blip r:embed="rId2" cstate="print">
+                <a:extLst>
+                  <a:ext uri="{28A0092B-C50C-407E-A947-70E740481C1C}">
+                    <a14:useLocalDpi xmlns:a14="http://schemas.microsoft.com/office/drawing/2010/main" val="0"/>
+                  </a:ext>
+                </a:extLst>
+              </a:blip>
+              <a:stretch>
+                <a:fillRect/>
+              </a:stretch>
+            </p:blipFill>
+            <p:spPr>
+              <a:xfrm>
+                <a:off x="6692877" y="977655"/>
+                <a:ext cx="3200400" cy="3200400"/>
+              </a:xfrm>
+              <a:prstGeom prst="rect">
+                <a:avLst/>
+              </a:prstGeom>
+            </p:spPr>
+          </p:pic>
+          <p:pic>
+            <p:nvPicPr>
+              <p:cNvPr id="6" name="圖片 5"/>
+              <p:cNvPicPr>
+                <a:picLocks noChangeAspect="1"/>
+              </p:cNvPicPr>
+              <p:nvPr/>
+            </p:nvPicPr>
+            <p:blipFill>
+              <a:blip r:embed="rId3" cstate="print">
+                <a:extLst>
+                  <a:ext uri="{28A0092B-C50C-407E-A947-70E740481C1C}">
+                    <a14:useLocalDpi xmlns:a14="http://schemas.microsoft.com/office/drawing/2010/main" val="0"/>
+                  </a:ext>
+                </a:extLst>
+              </a:blip>
+              <a:stretch>
+                <a:fillRect/>
+              </a:stretch>
+            </p:blipFill>
+            <p:spPr>
+              <a:xfrm>
+                <a:off x="1892277" y="977655"/>
+                <a:ext cx="4800600" cy="3200400"/>
+              </a:xfrm>
+              <a:prstGeom prst="rect">
+                <a:avLst/>
+              </a:prstGeom>
+            </p:spPr>
+          </p:pic>
+        </p:grpSp>
+        <p:grpSp>
+          <p:nvGrpSpPr>
+            <p:cNvPr id="4" name="群組 3"/>
+            <p:cNvGrpSpPr/>
+            <p:nvPr/>
+          </p:nvGrpSpPr>
+          <p:grpSpPr>
+            <a:xfrm>
+              <a:off x="2419619" y="3910784"/>
+              <a:ext cx="8001000" cy="3200400"/>
+              <a:chOff x="1571028" y="3657600"/>
+              <a:chExt cx="8001000" cy="3200400"/>
+            </a:xfrm>
+          </p:grpSpPr>
+          <p:pic>
+            <p:nvPicPr>
+              <p:cNvPr id="10" name="圖片 9"/>
+              <p:cNvPicPr>
+                <a:picLocks noChangeAspect="1"/>
+              </p:cNvPicPr>
+              <p:nvPr/>
+            </p:nvPicPr>
+            <p:blipFill>
+              <a:blip r:embed="rId4" cstate="print">
+                <a:extLst>
+                  <a:ext uri="{28A0092B-C50C-407E-A947-70E740481C1C}">
+                    <a14:useLocalDpi xmlns:a14="http://schemas.microsoft.com/office/drawing/2010/main" val="0"/>
+                  </a:ext>
+                </a:extLst>
+              </a:blip>
+              <a:stretch>
+                <a:fillRect/>
+              </a:stretch>
+            </p:blipFill>
+            <p:spPr>
+              <a:xfrm>
+                <a:off x="6371628" y="3657600"/>
+                <a:ext cx="3200400" cy="3200400"/>
+              </a:xfrm>
+              <a:prstGeom prst="rect">
+                <a:avLst/>
+              </a:prstGeom>
+            </p:spPr>
+          </p:pic>
+          <p:pic>
+            <p:nvPicPr>
+              <p:cNvPr id="3" name="圖片 2"/>
+              <p:cNvPicPr>
+                <a:picLocks noChangeAspect="1"/>
+              </p:cNvPicPr>
+              <p:nvPr/>
+            </p:nvPicPr>
+            <p:blipFill>
+              <a:blip r:embed="rId5" cstate="print">
+                <a:extLst>
+                  <a:ext uri="{28A0092B-C50C-407E-A947-70E740481C1C}">
+                    <a14:useLocalDpi xmlns:a14="http://schemas.microsoft.com/office/drawing/2010/main" val="0"/>
+                  </a:ext>
+                </a:extLst>
+              </a:blip>
+              <a:stretch>
+                <a:fillRect/>
+              </a:stretch>
+            </p:blipFill>
+            <p:spPr>
+              <a:xfrm>
+                <a:off x="1571028" y="3657600"/>
+                <a:ext cx="4800600" cy="3200400"/>
+              </a:xfrm>
+              <a:prstGeom prst="rect">
+                <a:avLst/>
+              </a:prstGeom>
+            </p:spPr>
+          </p:pic>
+        </p:grpSp>
       </p:grpSp>
       <p:pic>
         <p:nvPicPr>
@@ -3557,7 +3614,7 @@
           <p:nvPr/>
         </p:nvPicPr>
         <p:blipFill>
-          <a:blip r:embed="rId6">
+          <a:blip r:embed="rId6" cstate="print">
             <a:extLst>
               <a:ext uri="{28A0092B-C50C-407E-A947-70E740481C1C}">
                 <a14:useLocalDpi xmlns:a14="http://schemas.microsoft.com/office/drawing/2010/main" val="0"/>
@@ -3571,8 +3628,8 @@
         </p:blipFill>
         <p:spPr bwMode="auto">
           <a:xfrm>
-            <a:off x="3115193" y="-112542"/>
-            <a:ext cx="6349485" cy="794778"/>
+            <a:off x="4146358" y="0"/>
+            <a:ext cx="4714649" cy="590142"/>
           </a:xfrm>
           <a:prstGeom prst="rect">
             <a:avLst/>
@@ -3589,6 +3646,39 @@
           </a:extLst>
         </p:spPr>
       </p:pic>
+      <p:sp>
+        <p:nvSpPr>
+          <p:cNvPr id="8" name="矩形 7"/>
+          <p:cNvSpPr/>
+          <p:nvPr/>
+        </p:nvSpPr>
+        <p:spPr>
+          <a:xfrm>
+            <a:off x="10420619" y="6488668"/>
+            <a:ext cx="1391407" cy="369332"/>
+          </a:xfrm>
+          <a:prstGeom prst="rect">
+            <a:avLst/>
+          </a:prstGeom>
+        </p:spPr>
+        <p:txBody>
+          <a:bodyPr wrap="none">
+            <a:spAutoFit/>
+          </a:bodyPr>
+          <a:lstStyle/>
+          <a:p>
+            <a:r>
+              <a:rPr lang="zh-TW" altLang="en-US" dirty="0"/>
+              <a:t>nature</a:t>
+            </a:r>
+            <a:r>
+              <a:rPr lang="zh-TW" altLang="en-US" dirty="0" smtClean="0"/>
+              <a:t>05461</a:t>
+            </a:r>
+            <a:endParaRPr lang="zh-TW" altLang="en-US" dirty="0"/>
+          </a:p>
+        </p:txBody>
+      </p:sp>
     </p:spTree>
     <p:extLst>
       <p:ext uri="{BB962C8B-B14F-4D97-AF65-F5344CB8AC3E}">
@@ -3599,10 +3689,17 @@
   <p:clrMapOvr>
     <a:masterClrMapping/>
   </p:clrMapOvr>
+  <p:timing>
+    <p:tnLst>
+      <p:par>
+        <p:cTn id="1" dur="indefinite" restart="never" nodeType="tmRoot"/>
+      </p:par>
+    </p:tnLst>
+  </p:timing>
 </p:sld>
 </file>
 
-<file path=ppt/slides/slide14.xml><?xml version="1.0" encoding="utf-8"?>
+<file path=ppt/slides/slide13.xml><?xml version="1.0" encoding="utf-8"?>
 <p:sld xmlns:a="http://schemas.openxmlformats.org/drawingml/2006/main" xmlns:r="http://schemas.openxmlformats.org/officeDocument/2006/relationships" xmlns:p="http://schemas.openxmlformats.org/presentationml/2006/main">
   <p:cSld>
     <p:spTree>
@@ -3619,156 +3716,141 @@
           <a:chExt cx="0" cy="0"/>
         </a:xfrm>
       </p:grpSpPr>
-      <p:pic>
-        <p:nvPicPr>
-          <p:cNvPr id="6" name="圖片 5"/>
-          <p:cNvPicPr>
-            <a:picLocks noChangeAspect="1"/>
-          </p:cNvPicPr>
+      <p:grpSp>
+        <p:nvGrpSpPr>
+          <p:cNvPr id="8" name="群組 7"/>
+          <p:cNvGrpSpPr/>
           <p:nvPr/>
-        </p:nvPicPr>
-        <p:blipFill>
-          <a:blip r:embed="rId2" cstate="print">
-            <a:extLst>
-              <a:ext uri="{28A0092B-C50C-407E-A947-70E740481C1C}">
-                <a14:useLocalDpi xmlns:a14="http://schemas.microsoft.com/office/drawing/2010/main" val="0"/>
-              </a:ext>
-            </a:extLst>
-          </a:blip>
-          <a:stretch>
-            <a:fillRect/>
-          </a:stretch>
-        </p:blipFill>
-        <p:spPr>
+        </p:nvGrpSpPr>
+        <p:grpSpPr>
           <a:xfrm>
-            <a:off x="3725575" y="274710"/>
-            <a:ext cx="4800600" cy="3200400"/>
+            <a:off x="1520538" y="207819"/>
+            <a:ext cx="9601200" cy="6400800"/>
+            <a:chOff x="1395846" y="332509"/>
+            <a:chExt cx="9601200" cy="6400800"/>
           </a:xfrm>
-          <a:prstGeom prst="rect">
-            <a:avLst/>
-          </a:prstGeom>
-        </p:spPr>
-      </p:pic>
-      <p:pic>
-        <p:nvPicPr>
-          <p:cNvPr id="7" name="圖片 6"/>
-          <p:cNvPicPr>
-            <a:picLocks noChangeAspect="1"/>
-          </p:cNvPicPr>
-          <p:nvPr/>
-        </p:nvPicPr>
-        <p:blipFill>
-          <a:blip r:embed="rId3" cstate="print">
-            <a:extLst>
-              <a:ext uri="{28A0092B-C50C-407E-A947-70E740481C1C}">
-                <a14:useLocalDpi xmlns:a14="http://schemas.microsoft.com/office/drawing/2010/main" val="0"/>
-              </a:ext>
-            </a:extLst>
-          </a:blip>
-          <a:stretch>
-            <a:fillRect/>
-          </a:stretch>
-        </p:blipFill>
-        <p:spPr>
-          <a:xfrm>
-            <a:off x="3725575" y="3475110"/>
-            <a:ext cx="4800600" cy="3200400"/>
-          </a:xfrm>
-          <a:prstGeom prst="rect">
-            <a:avLst/>
-          </a:prstGeom>
-        </p:spPr>
-      </p:pic>
-    </p:spTree>
-    <p:extLst>
-      <p:ext uri="{BB962C8B-B14F-4D97-AF65-F5344CB8AC3E}">
-        <p14:creationId xmlns:p14="http://schemas.microsoft.com/office/powerpoint/2010/main" val="3177817181"/>
-      </p:ext>
-    </p:extLst>
-  </p:cSld>
-  <p:clrMapOvr>
-    <a:masterClrMapping/>
-  </p:clrMapOvr>
-</p:sld>
-</file>
-
-<file path=ppt/slides/slide15.xml><?xml version="1.0" encoding="utf-8"?>
-<p:sld xmlns:a="http://schemas.openxmlformats.org/drawingml/2006/main" xmlns:r="http://schemas.openxmlformats.org/officeDocument/2006/relationships" xmlns:p="http://schemas.openxmlformats.org/presentationml/2006/main">
-  <p:cSld>
-    <p:spTree>
-      <p:nvGrpSpPr>
-        <p:cNvPr id="1" name=""/>
-        <p:cNvGrpSpPr/>
-        <p:nvPr/>
-      </p:nvGrpSpPr>
-      <p:grpSpPr>
-        <a:xfrm>
-          <a:off x="0" y="0"/>
-          <a:ext cx="0" cy="0"/>
-          <a:chOff x="0" y="0"/>
-          <a:chExt cx="0" cy="0"/>
-        </a:xfrm>
-      </p:grpSpPr>
-      <p:pic>
-        <p:nvPicPr>
-          <p:cNvPr id="2" name="圖片 1"/>
-          <p:cNvPicPr>
-            <a:picLocks noChangeAspect="1"/>
-          </p:cNvPicPr>
-          <p:nvPr/>
-        </p:nvPicPr>
-        <p:blipFill>
-          <a:blip r:embed="rId2" cstate="print">
-            <a:extLst>
-              <a:ext uri="{28A0092B-C50C-407E-A947-70E740481C1C}">
-                <a14:useLocalDpi xmlns:a14="http://schemas.microsoft.com/office/drawing/2010/main" val="0"/>
-              </a:ext>
-            </a:extLst>
-          </a:blip>
-          <a:stretch>
-            <a:fillRect/>
-          </a:stretch>
-        </p:blipFill>
-        <p:spPr>
-          <a:xfrm>
-            <a:off x="4034704" y="208684"/>
-            <a:ext cx="4800600" cy="3200400"/>
-          </a:xfrm>
-          <a:prstGeom prst="rect">
-            <a:avLst/>
-          </a:prstGeom>
-        </p:spPr>
-      </p:pic>
-      <p:pic>
-        <p:nvPicPr>
-          <p:cNvPr id="3" name="圖片 2"/>
-          <p:cNvPicPr>
-            <a:picLocks noChangeAspect="1"/>
-          </p:cNvPicPr>
-          <p:nvPr/>
-        </p:nvPicPr>
-        <p:blipFill>
-          <a:blip r:embed="rId3" cstate="print">
-            <a:extLst>
-              <a:ext uri="{28A0092B-C50C-407E-A947-70E740481C1C}">
-                <a14:useLocalDpi xmlns:a14="http://schemas.microsoft.com/office/drawing/2010/main" val="0"/>
-              </a:ext>
-            </a:extLst>
-          </a:blip>
-          <a:stretch>
-            <a:fillRect/>
-          </a:stretch>
-        </p:blipFill>
-        <p:spPr>
-          <a:xfrm>
-            <a:off x="4034704" y="3409084"/>
-            <a:ext cx="4800600" cy="3200400"/>
-          </a:xfrm>
-          <a:prstGeom prst="rect">
-            <a:avLst/>
-          </a:prstGeom>
-        </p:spPr>
-      </p:pic>
+        </p:grpSpPr>
+        <p:pic>
+          <p:nvPicPr>
+            <p:cNvPr id="4" name="圖片 3"/>
+            <p:cNvPicPr>
+              <a:picLocks noChangeAspect="1"/>
+            </p:cNvPicPr>
+            <p:nvPr/>
+          </p:nvPicPr>
+          <p:blipFill>
+            <a:blip r:embed="rId2" cstate="print">
+              <a:extLst>
+                <a:ext uri="{28A0092B-C50C-407E-A947-70E740481C1C}">
+                  <a14:useLocalDpi xmlns:a14="http://schemas.microsoft.com/office/drawing/2010/main" val="0"/>
+                </a:ext>
+              </a:extLst>
+            </a:blip>
+            <a:stretch>
+              <a:fillRect/>
+            </a:stretch>
+          </p:blipFill>
+          <p:spPr>
+            <a:xfrm>
+              <a:off x="1395846" y="332509"/>
+              <a:ext cx="4800600" cy="3200400"/>
+            </a:xfrm>
+            <a:prstGeom prst="rect">
+              <a:avLst/>
+            </a:prstGeom>
+          </p:spPr>
+        </p:pic>
+        <p:pic>
+          <p:nvPicPr>
+            <p:cNvPr id="5" name="圖片 4"/>
+            <p:cNvPicPr>
+              <a:picLocks noChangeAspect="1"/>
+            </p:cNvPicPr>
+            <p:nvPr/>
+          </p:nvPicPr>
+          <p:blipFill>
+            <a:blip r:embed="rId3" cstate="print">
+              <a:extLst>
+                <a:ext uri="{28A0092B-C50C-407E-A947-70E740481C1C}">
+                  <a14:useLocalDpi xmlns:a14="http://schemas.microsoft.com/office/drawing/2010/main" val="0"/>
+                </a:ext>
+              </a:extLst>
+            </a:blip>
+            <a:stretch>
+              <a:fillRect/>
+            </a:stretch>
+          </p:blipFill>
+          <p:spPr>
+            <a:xfrm>
+              <a:off x="1395846" y="3532909"/>
+              <a:ext cx="4800600" cy="3200400"/>
+            </a:xfrm>
+            <a:prstGeom prst="rect">
+              <a:avLst/>
+            </a:prstGeom>
+          </p:spPr>
+        </p:pic>
+        <p:pic>
+          <p:nvPicPr>
+            <p:cNvPr id="6" name="圖片 5"/>
+            <p:cNvPicPr>
+              <a:picLocks noChangeAspect="1"/>
+            </p:cNvPicPr>
+            <p:nvPr/>
+          </p:nvPicPr>
+          <p:blipFill>
+            <a:blip r:embed="rId4" cstate="print">
+              <a:extLst>
+                <a:ext uri="{28A0092B-C50C-407E-A947-70E740481C1C}">
+                  <a14:useLocalDpi xmlns:a14="http://schemas.microsoft.com/office/drawing/2010/main" val="0"/>
+                </a:ext>
+              </a:extLst>
+            </a:blip>
+            <a:stretch>
+              <a:fillRect/>
+            </a:stretch>
+          </p:blipFill>
+          <p:spPr>
+            <a:xfrm>
+              <a:off x="6196446" y="332509"/>
+              <a:ext cx="4800600" cy="3200400"/>
+            </a:xfrm>
+            <a:prstGeom prst="rect">
+              <a:avLst/>
+            </a:prstGeom>
+          </p:spPr>
+        </p:pic>
+        <p:pic>
+          <p:nvPicPr>
+            <p:cNvPr id="7" name="圖片 6"/>
+            <p:cNvPicPr>
+              <a:picLocks noChangeAspect="1"/>
+            </p:cNvPicPr>
+            <p:nvPr/>
+          </p:nvPicPr>
+          <p:blipFill>
+            <a:blip r:embed="rId5" cstate="print">
+              <a:extLst>
+                <a:ext uri="{28A0092B-C50C-407E-A947-70E740481C1C}">
+                  <a14:useLocalDpi xmlns:a14="http://schemas.microsoft.com/office/drawing/2010/main" val="0"/>
+                </a:ext>
+              </a:extLst>
+            </a:blip>
+            <a:stretch>
+              <a:fillRect/>
+            </a:stretch>
+          </p:blipFill>
+          <p:spPr>
+            <a:xfrm>
+              <a:off x="6196446" y="3532909"/>
+              <a:ext cx="4800600" cy="3200400"/>
+            </a:xfrm>
+            <a:prstGeom prst="rect">
+              <a:avLst/>
+            </a:prstGeom>
+          </p:spPr>
+        </p:pic>
+      </p:grpSp>
     </p:spTree>
     <p:extLst>
       <p:ext uri="{BB962C8B-B14F-4D97-AF65-F5344CB8AC3E}">
@@ -3779,78 +3861,17 @@
   <p:clrMapOvr>
     <a:masterClrMapping/>
   </p:clrMapOvr>
+  <p:timing>
+    <p:tnLst>
+      <p:par>
+        <p:cTn id="1" dur="indefinite" restart="never" nodeType="tmRoot"/>
+      </p:par>
+    </p:tnLst>
+  </p:timing>
 </p:sld>
 </file>
 
 <file path=ppt/slides/slide2.xml><?xml version="1.0" encoding="utf-8"?>
-<p:sld xmlns:a="http://schemas.openxmlformats.org/drawingml/2006/main" xmlns:r="http://schemas.openxmlformats.org/officeDocument/2006/relationships" xmlns:p="http://schemas.openxmlformats.org/presentationml/2006/main">
-  <p:cSld>
-    <p:spTree>
-      <p:nvGrpSpPr>
-        <p:cNvPr id="1" name=""/>
-        <p:cNvGrpSpPr/>
-        <p:nvPr/>
-      </p:nvGrpSpPr>
-      <p:grpSpPr>
-        <a:xfrm>
-          <a:off x="0" y="0"/>
-          <a:ext cx="0" cy="0"/>
-          <a:chOff x="0" y="0"/>
-          <a:chExt cx="0" cy="0"/>
-        </a:xfrm>
-      </p:grpSpPr>
-      <p:sp>
-        <p:nvSpPr>
-          <p:cNvPr id="2" name="標題 1"/>
-          <p:cNvSpPr>
-            <a:spLocks noGrp="1"/>
-          </p:cNvSpPr>
-          <p:nvPr>
-            <p:ph type="title"/>
-          </p:nvPr>
-        </p:nvSpPr>
-        <p:spPr/>
-        <p:txBody>
-          <a:bodyPr/>
-          <a:lstStyle/>
-          <a:p>
-            <a:endParaRPr lang="zh-TW" altLang="en-US"/>
-          </a:p>
-        </p:txBody>
-      </p:sp>
-      <p:sp>
-        <p:nvSpPr>
-          <p:cNvPr id="3" name="內容版面配置區 2"/>
-          <p:cNvSpPr>
-            <a:spLocks noGrp="1"/>
-          </p:cNvSpPr>
-          <p:nvPr>
-            <p:ph idx="1"/>
-          </p:nvPr>
-        </p:nvSpPr>
-        <p:spPr/>
-        <p:txBody>
-          <a:bodyPr/>
-          <a:lstStyle/>
-          <a:p>
-            <a:endParaRPr lang="zh-TW" altLang="en-US"/>
-          </a:p>
-        </p:txBody>
-      </p:sp>
-    </p:spTree>
-    <p:extLst>
-      <p:ext uri="{BB962C8B-B14F-4D97-AF65-F5344CB8AC3E}">
-        <p14:creationId xmlns:p14="http://schemas.microsoft.com/office/powerpoint/2010/main" val="3517742245"/>
-      </p:ext>
-    </p:extLst>
-  </p:cSld>
-  <p:clrMapOvr>
-    <a:masterClrMapping/>
-  </p:clrMapOvr>
-</p:sld>
-</file>
-
-<file path=ppt/slides/slide3.xml><?xml version="1.0" encoding="utf-8"?>
 <p:sld xmlns:a="http://schemas.openxmlformats.org/drawingml/2006/main" xmlns:r="http://schemas.openxmlformats.org/officeDocument/2006/relationships" xmlns:p="http://schemas.openxmlformats.org/presentationml/2006/main">
   <p:cSld>
     <p:spTree>
@@ -3987,7 +4008,7 @@
 </p:sld>
 </file>
 
-<file path=ppt/slides/slide4.xml><?xml version="1.0" encoding="utf-8"?>
+<file path=ppt/slides/slide3.xml><?xml version="1.0" encoding="utf-8"?>
 <p:sld xmlns:a="http://schemas.openxmlformats.org/drawingml/2006/main" xmlns:r="http://schemas.openxmlformats.org/officeDocument/2006/relationships" xmlns:p="http://schemas.openxmlformats.org/presentationml/2006/main">
   <p:cSld>
     <p:spTree>
@@ -4162,7 +4183,7 @@
 </p:sld>
 </file>
 
-<file path=ppt/slides/slide5.xml><?xml version="1.0" encoding="utf-8"?>
+<file path=ppt/slides/slide4.xml><?xml version="1.0" encoding="utf-8"?>
 <p:sld xmlns:a="http://schemas.openxmlformats.org/drawingml/2006/main" xmlns:r="http://schemas.openxmlformats.org/officeDocument/2006/relationships" xmlns:p="http://schemas.openxmlformats.org/presentationml/2006/main">
   <p:cSld>
     <p:spTree>
@@ -4258,7 +4279,7 @@
 </p:sld>
 </file>
 
-<file path=ppt/slides/slide6.xml><?xml version="1.0" encoding="utf-8"?>
+<file path=ppt/slides/slide5.xml><?xml version="1.0" encoding="utf-8"?>
 <p:sld xmlns:a="http://schemas.openxmlformats.org/drawingml/2006/main" xmlns:r="http://schemas.openxmlformats.org/officeDocument/2006/relationships" xmlns:p="http://schemas.openxmlformats.org/presentationml/2006/main">
   <p:cSld>
     <p:spTree>
@@ -4354,7 +4375,7 @@
 </p:sld>
 </file>
 
-<file path=ppt/slides/slide7.xml><?xml version="1.0" encoding="utf-8"?>
+<file path=ppt/slides/slide6.xml><?xml version="1.0" encoding="utf-8"?>
 <p:sld xmlns:a="http://schemas.openxmlformats.org/drawingml/2006/main" xmlns:r="http://schemas.openxmlformats.org/officeDocument/2006/relationships" xmlns:p="http://schemas.openxmlformats.org/presentationml/2006/main">
   <p:cSld>
     <p:spTree>
@@ -4450,7 +4471,7 @@
 </p:sld>
 </file>
 
-<file path=ppt/slides/slide8.xml><?xml version="1.0" encoding="utf-8"?>
+<file path=ppt/slides/slide7.xml><?xml version="1.0" encoding="utf-8"?>
 <p:sld xmlns:a="http://schemas.openxmlformats.org/drawingml/2006/main" xmlns:r="http://schemas.openxmlformats.org/officeDocument/2006/relationships" xmlns:p="http://schemas.openxmlformats.org/presentationml/2006/main">
   <p:cSld>
     <p:spTree>
@@ -4517,7 +4538,7 @@
 </p:sld>
 </file>
 
-<file path=ppt/slides/slide9.xml><?xml version="1.0" encoding="utf-8"?>
+<file path=ppt/slides/slide8.xml><?xml version="1.0" encoding="utf-8"?>
 <p:sld xmlns:a="http://schemas.openxmlformats.org/drawingml/2006/main" xmlns:r="http://schemas.openxmlformats.org/officeDocument/2006/relationships" xmlns:p="http://schemas.openxmlformats.org/presentationml/2006/main">
   <p:cSld>
     <p:spTree>
@@ -4581,6 +4602,66 @@
       </p:par>
     </p:tnLst>
   </p:timing>
+</p:sld>
+</file>
+
+<file path=ppt/slides/slide9.xml><?xml version="1.0" encoding="utf-8"?>
+<p:sld xmlns:a="http://schemas.openxmlformats.org/drawingml/2006/main" xmlns:r="http://schemas.openxmlformats.org/officeDocument/2006/relationships" xmlns:p="http://schemas.openxmlformats.org/presentationml/2006/main">
+  <p:cSld>
+    <p:spTree>
+      <p:nvGrpSpPr>
+        <p:cNvPr id="1" name=""/>
+        <p:cNvGrpSpPr/>
+        <p:nvPr/>
+      </p:nvGrpSpPr>
+      <p:grpSpPr>
+        <a:xfrm>
+          <a:off x="0" y="0"/>
+          <a:ext cx="0" cy="0"/>
+          <a:chOff x="0" y="0"/>
+          <a:chExt cx="0" cy="0"/>
+        </a:xfrm>
+      </p:grpSpPr>
+      <p:pic>
+        <p:nvPicPr>
+          <p:cNvPr id="2" name="圖片 1"/>
+          <p:cNvPicPr>
+            <a:picLocks noChangeAspect="1"/>
+          </p:cNvPicPr>
+          <p:nvPr/>
+        </p:nvPicPr>
+        <p:blipFill>
+          <a:blip r:embed="rId2" cstate="print">
+            <a:extLst>
+              <a:ext uri="{28A0092B-C50C-407E-A947-70E740481C1C}">
+                <a14:useLocalDpi xmlns:a14="http://schemas.microsoft.com/office/drawing/2010/main" val="0"/>
+              </a:ext>
+            </a:extLst>
+          </a:blip>
+          <a:stretch>
+            <a:fillRect/>
+          </a:stretch>
+        </p:blipFill>
+        <p:spPr>
+          <a:xfrm>
+            <a:off x="1800225" y="233507"/>
+            <a:ext cx="8479412" cy="5652941"/>
+          </a:xfrm>
+          <a:prstGeom prst="rect">
+            <a:avLst/>
+          </a:prstGeom>
+        </p:spPr>
+      </p:pic>
+    </p:spTree>
+    <p:extLst>
+      <p:ext uri="{BB962C8B-B14F-4D97-AF65-F5344CB8AC3E}">
+        <p14:creationId xmlns:p14="http://schemas.microsoft.com/office/powerpoint/2010/main" val="1640291520"/>
+      </p:ext>
+    </p:extLst>
+  </p:cSld>
+  <p:clrMapOvr>
+    <a:masterClrMapping/>
+  </p:clrMapOvr>
 </p:sld>
 </file>
 

</xml_diff>